<commit_message>
Added some baseline tests
</commit_message>
<xml_diff>
--- a/visuals/slides.pptx
+++ b/visuals/slides.pptx
@@ -16,6 +16,9 @@
     <p:sldId id="264" r:id="rId11"/>
     <p:sldId id="265" r:id="rId12"/>
     <p:sldId id="266" r:id="rId13"/>
+    <p:sldId id="267" r:id="rId14"/>
+    <p:sldId id="268" r:id="rId15"/>
+    <p:sldId id="269" r:id="rId16"/>
   </p:sldIdLst>
   <p:sldSz cx="12192000" cy="6858000"/>
   <p:notesSz cx="12192000" cy="6858000"/>
@@ -4496,6 +4499,597 @@
               <a:t>much more stable, even with equal mean for distributions</a:t>
             </a:r>
             <a:endParaRPr/>
+          </a:p>
+        </p:txBody>
+      </p:sp>
+    </p:spTree>
+  </p:cSld>
+  <p:clrMapOvr>
+    <a:masterClrMapping/>
+  </p:clrMapOvr>
+  <mc:AlternateContent xmlns:mc="http://schemas.openxmlformats.org/markup-compatibility/2006">
+    <mc:Choice xmlns:p14="http://schemas.microsoft.com/office/powerpoint/2010/main" Requires="p14">
+      <p:transition p14:dur="2000" advClick="1"/>
+    </mc:Choice>
+    <mc:Fallback>
+      <p:transition advClick="1"/>
+    </mc:Fallback>
+  </mc:AlternateContent>
+</p:sld>
+</file>
+
+<file path=ppt/slides/slide12.xml><?xml version="1.0" encoding="utf-8"?>
+<p:sld xmlns:a="http://schemas.openxmlformats.org/drawingml/2006/main" xmlns:r="http://schemas.openxmlformats.org/officeDocument/2006/relationships" xmlns:p="http://schemas.openxmlformats.org/presentationml/2006/main" xmlns:m="http://schemas.openxmlformats.org/officeDocument/2006/math" xmlns:w="http://schemas.openxmlformats.org/wordprocessingml/2006/main" showMasterPhAnim="0" show="1">
+  <p:cSld name="">
+    <p:spTree>
+      <p:nvGrpSpPr>
+        <p:cNvPr id="1" name=""/>
+        <p:cNvGrpSpPr/>
+        <p:nvPr/>
+      </p:nvGrpSpPr>
+      <p:grpSpPr bwMode="auto">
+        <a:xfrm>
+          <a:off x="0" y="0"/>
+          <a:ext cx="0" cy="0"/>
+          <a:chOff x="0" y="0"/>
+          <a:chExt cx="0" cy="0"/>
+        </a:xfrm>
+      </p:grpSpPr>
+      <p:sp>
+        <p:nvSpPr>
+          <p:cNvPr id="1431007101" name="Заголовок 1"/>
+          <p:cNvSpPr>
+            <a:spLocks noGrp="1"/>
+          </p:cNvSpPr>
+          <p:nvPr>
+            <p:ph type="title"/>
+          </p:nvPr>
+        </p:nvSpPr>
+        <p:spPr bwMode="auto"/>
+        <p:txBody>
+          <a:bodyPr/>
+          <a:lstStyle/>
+          <a:p>
+            <a:pPr>
+              <a:defRPr/>
+            </a:pPr>
+            <a:r>
+              <a:rPr lang="de-DE"/>
+              <a:t>Agents</a:t>
+            </a:r>
+            <a:endParaRPr/>
+          </a:p>
+        </p:txBody>
+      </p:sp>
+      <p:sp>
+        <p:nvSpPr>
+          <p:cNvPr id="582933044" name="Объект 2"/>
+          <p:cNvSpPr>
+            <a:spLocks noGrp="1"/>
+          </p:cNvSpPr>
+          <p:nvPr>
+            <p:ph idx="1"/>
+          </p:nvPr>
+        </p:nvSpPr>
+        <p:spPr bwMode="auto">
+          <a:xfrm flipH="0" flipV="0">
+            <a:off x="609598" y="1600200"/>
+            <a:ext cx="10972800" cy="5054847"/>
+          </a:xfrm>
+        </p:spPr>
+        <p:txBody>
+          <a:bodyPr vertOverflow="overflow" horzOverflow="overflow" vert="horz" wrap="square" lIns="91440" tIns="45720" rIns="91440" bIns="45720" numCol="1" spcCol="0" rtlCol="0" fromWordArt="0" anchor="t" anchorCtr="0" forceAA="0" upright="0" compatLnSpc="0">
+            <a:normAutofit fontScale="85000" lnSpcReduction="3000"/>
+          </a:bodyPr>
+          <a:lstStyle/>
+          <a:p>
+            <a:pPr>
+              <a:lnSpc>
+                <a:spcPct val="114999"/>
+              </a:lnSpc>
+              <a:defRPr/>
+            </a:pPr>
+            <a:r>
+              <a:rPr lang="de-DE"/>
+              <a:t>A2C</a:t>
+            </a:r>
+            <a:endParaRPr lang="de-DE"/>
+          </a:p>
+          <a:p>
+            <a:pPr lvl="1">
+              <a:lnSpc>
+                <a:spcPct val="114999"/>
+              </a:lnSpc>
+              <a:defRPr/>
+            </a:pPr>
+            <a:r>
+              <a:rPr lang="de-DE"/>
+              <a:t>Longest runs</a:t>
+            </a:r>
+            <a:r>
+              <a:rPr lang="de-DE"/>
+              <a:t> with 20,000 training steps:		~16,000</a:t>
+            </a:r>
+            <a:endParaRPr lang="de-DE"/>
+          </a:p>
+          <a:p>
+            <a:pPr lvl="1">
+              <a:lnSpc>
+                <a:spcPct val="114999"/>
+              </a:lnSpc>
+              <a:defRPr/>
+            </a:pPr>
+            <a:r>
+              <a:rPr lang="de-DE"/>
+              <a:t>Still okay with 2,000 steps:				~4,000</a:t>
+            </a:r>
+            <a:endParaRPr lang="de-DE"/>
+          </a:p>
+          <a:p>
+            <a:pPr lvl="1">
+              <a:lnSpc>
+                <a:spcPct val="114999"/>
+              </a:lnSpc>
+              <a:defRPr/>
+            </a:pPr>
+            <a:r>
+              <a:rPr lang="de-DE"/>
+              <a:t>Fails with only 200 steps</a:t>
+            </a:r>
+            <a:endParaRPr lang="de-DE"/>
+          </a:p>
+          <a:p>
+            <a:pPr marL="457200" lvl="1" indent="0">
+              <a:lnSpc>
+                <a:spcPct val="114999"/>
+              </a:lnSpc>
+              <a:buFont typeface="Arial"/>
+              <a:buNone/>
+              <a:defRPr/>
+            </a:pPr>
+            <a:endParaRPr lang="de-DE"/>
+          </a:p>
+          <a:p>
+            <a:pPr>
+              <a:lnSpc>
+                <a:spcPct val="114999"/>
+              </a:lnSpc>
+              <a:defRPr/>
+            </a:pPr>
+            <a:r>
+              <a:rPr lang="de-DE"/>
+              <a:t>PPO		</a:t>
+            </a:r>
+            <a:endParaRPr lang="de-DE"/>
+          </a:p>
+          <a:p>
+            <a:pPr lvl="1">
+              <a:lnSpc>
+                <a:spcPct val="114999"/>
+              </a:lnSpc>
+              <a:defRPr/>
+            </a:pPr>
+            <a:r>
+              <a:rPr lang="de-DE"/>
+              <a:t>Weaker than A2C at 20,000:			~8,000</a:t>
+            </a:r>
+            <a:endParaRPr lang="de-DE"/>
+          </a:p>
+          <a:p>
+            <a:pPr lvl="1">
+              <a:lnSpc>
+                <a:spcPct val="114999"/>
+              </a:lnSpc>
+              <a:defRPr/>
+            </a:pPr>
+            <a:r>
+              <a:rPr lang="de-DE"/>
+              <a:t>Fails with 2,000 steps</a:t>
+            </a:r>
+            <a:endParaRPr lang="de-DE"/>
+          </a:p>
+          <a:p>
+            <a:pPr marL="457200" lvl="1" indent="0">
+              <a:lnSpc>
+                <a:spcPct val="114999"/>
+              </a:lnSpc>
+              <a:buFont typeface="Arial"/>
+              <a:buNone/>
+              <a:defRPr/>
+            </a:pPr>
+            <a:endParaRPr lang="de-DE"/>
+          </a:p>
+          <a:p>
+            <a:pPr>
+              <a:lnSpc>
+                <a:spcPct val="114999"/>
+              </a:lnSpc>
+              <a:defRPr/>
+            </a:pPr>
+            <a:r>
+              <a:rPr lang="de-DE"/>
+              <a:t>DQN</a:t>
+            </a:r>
+            <a:endParaRPr lang="de-DE"/>
+          </a:p>
+          <a:p>
+            <a:pPr lvl="1">
+              <a:lnSpc>
+                <a:spcPct val="114999"/>
+              </a:lnSpc>
+              <a:defRPr/>
+            </a:pPr>
+            <a:r>
+              <a:rPr lang="de-DE"/>
+              <a:t>Useless, even with 20,000 steps no results (chooses no action too often)</a:t>
+            </a:r>
+            <a:endParaRPr lang="de-DE"/>
+          </a:p>
+        </p:txBody>
+      </p:sp>
+    </p:spTree>
+  </p:cSld>
+  <p:clrMapOvr>
+    <a:masterClrMapping/>
+  </p:clrMapOvr>
+  <mc:AlternateContent xmlns:mc="http://schemas.openxmlformats.org/markup-compatibility/2006">
+    <mc:Choice xmlns:p14="http://schemas.microsoft.com/office/powerpoint/2010/main" Requires="p14">
+      <p:transition p14:dur="2000" advClick="1"/>
+    </mc:Choice>
+    <mc:Fallback>
+      <p:transition advClick="1"/>
+    </mc:Fallback>
+  </mc:AlternateContent>
+</p:sld>
+</file>
+
+<file path=ppt/slides/slide13.xml><?xml version="1.0" encoding="utf-8"?>
+<p:sld xmlns:a="http://schemas.openxmlformats.org/drawingml/2006/main" xmlns:r="http://schemas.openxmlformats.org/officeDocument/2006/relationships" xmlns:p="http://schemas.openxmlformats.org/presentationml/2006/main" xmlns:m="http://schemas.openxmlformats.org/officeDocument/2006/math" xmlns:w="http://schemas.openxmlformats.org/wordprocessingml/2006/main" showMasterPhAnim="0" show="1">
+  <p:cSld name="">
+    <p:spTree>
+      <p:nvGrpSpPr>
+        <p:cNvPr id="1" name=""/>
+        <p:cNvGrpSpPr/>
+        <p:nvPr/>
+      </p:nvGrpSpPr>
+      <p:grpSpPr bwMode="auto">
+        <a:xfrm>
+          <a:off x="0" y="0"/>
+          <a:ext cx="0" cy="0"/>
+          <a:chOff x="0" y="0"/>
+          <a:chExt cx="0" cy="0"/>
+        </a:xfrm>
+      </p:grpSpPr>
+      <p:sp>
+        <p:nvSpPr>
+          <p:cNvPr id="874321770" name="Заголовок 1"/>
+          <p:cNvSpPr>
+            <a:spLocks noGrp="1"/>
+          </p:cNvSpPr>
+          <p:nvPr>
+            <p:ph type="title"/>
+          </p:nvPr>
+        </p:nvSpPr>
+        <p:spPr bwMode="auto"/>
+        <p:txBody>
+          <a:bodyPr/>
+          <a:lstStyle/>
+          <a:p>
+            <a:pPr>
+              <a:defRPr/>
+            </a:pPr>
+            <a:r>
+              <a:rPr lang="de-DE"/>
+              <a:t>Agents</a:t>
+            </a:r>
+            <a:endParaRPr/>
+          </a:p>
+        </p:txBody>
+      </p:sp>
+      <p:sp>
+        <p:nvSpPr>
+          <p:cNvPr id="2110901467" name="Объект 2"/>
+          <p:cNvSpPr>
+            <a:spLocks noGrp="1"/>
+          </p:cNvSpPr>
+          <p:nvPr>
+            <p:ph idx="1"/>
+          </p:nvPr>
+        </p:nvSpPr>
+        <p:spPr bwMode="auto">
+          <a:xfrm flipH="0" flipV="0">
+            <a:off x="609598" y="1600200"/>
+            <a:ext cx="10972800" cy="5054847"/>
+          </a:xfrm>
+        </p:spPr>
+        <p:txBody>
+          <a:bodyPr vertOverflow="overflow" horzOverflow="overflow" vert="horz" wrap="square" lIns="91440" tIns="45720" rIns="91440" bIns="45720" numCol="1" spcCol="0" rtlCol="0" fromWordArt="0" anchor="t" anchorCtr="0" forceAA="0" upright="0" compatLnSpc="0">
+            <a:normAutofit fontScale="95000" lnSpcReduction="1000"/>
+          </a:bodyPr>
+          <a:lstStyle/>
+          <a:p>
+            <a:pPr>
+              <a:lnSpc>
+                <a:spcPct val="114999"/>
+              </a:lnSpc>
+              <a:defRPr/>
+            </a:pPr>
+            <a:r>
+              <a:rPr lang="de-DE"/>
+              <a:t>Random</a:t>
+            </a:r>
+            <a:endParaRPr lang="de-DE"/>
+          </a:p>
+          <a:p>
+            <a:pPr lvl="1">
+              <a:lnSpc>
+                <a:spcPct val="114999"/>
+              </a:lnSpc>
+              <a:defRPr/>
+            </a:pPr>
+            <a:r>
+              <a:rPr lang="de-DE"/>
+              <a:t>As a baseline, but also chooses no action to often and fails</a:t>
+            </a:r>
+            <a:endParaRPr lang="de-DE"/>
+          </a:p>
+          <a:p>
+            <a:pPr marL="457200" lvl="1" indent="0">
+              <a:lnSpc>
+                <a:spcPct val="114999"/>
+              </a:lnSpc>
+              <a:buFont typeface="Arial"/>
+              <a:buNone/>
+              <a:defRPr/>
+            </a:pPr>
+            <a:endParaRPr lang="de-DE"/>
+          </a:p>
+          <a:p>
+            <a:pPr>
+              <a:lnSpc>
+                <a:spcPct val="114999"/>
+              </a:lnSpc>
+              <a:defRPr/>
+            </a:pPr>
+            <a:r>
+              <a:rPr lang="de-DE"/>
+              <a:t>Toggle</a:t>
+            </a:r>
+            <a:endParaRPr lang="de-DE"/>
+          </a:p>
+          <a:p>
+            <a:pPr lvl="1">
+              <a:lnSpc>
+                <a:spcPct val="114999"/>
+              </a:lnSpc>
+              <a:defRPr/>
+            </a:pPr>
+            <a:r>
+              <a:rPr lang="de-DE"/>
+              <a:t>Chooses left and right light in alternation</a:t>
+            </a:r>
+            <a:endParaRPr lang="de-DE"/>
+          </a:p>
+          <a:p>
+            <a:pPr lvl="1">
+              <a:lnSpc>
+                <a:spcPct val="114999"/>
+              </a:lnSpc>
+              <a:defRPr/>
+            </a:pPr>
+            <a:r>
+              <a:rPr lang="de-DE"/>
+              <a:t>Can‘t consider long queues, fails quickly:		~200</a:t>
+            </a:r>
+            <a:endParaRPr lang="de-DE"/>
+          </a:p>
+          <a:p>
+            <a:pPr lvl="1">
+              <a:lnSpc>
+                <a:spcPct val="114999"/>
+              </a:lnSpc>
+              <a:defRPr/>
+            </a:pPr>
+            <a:endParaRPr lang="de-DE"/>
+          </a:p>
+          <a:p>
+            <a:pPr>
+              <a:lnSpc>
+                <a:spcPct val="114999"/>
+              </a:lnSpc>
+              <a:defRPr/>
+            </a:pPr>
+            <a:r>
+              <a:rPr lang="de-DE"/>
+              <a:t>Manual</a:t>
+            </a:r>
+            <a:endParaRPr lang="de-DE"/>
+          </a:p>
+          <a:p>
+            <a:pPr lvl="1">
+              <a:lnSpc>
+                <a:spcPct val="114999"/>
+              </a:lnSpc>
+              <a:defRPr/>
+            </a:pPr>
+            <a:r>
+              <a:rPr lang="de-DE"/>
+              <a:t>Chooses light at which more cars are waiting</a:t>
+            </a:r>
+            <a:endParaRPr lang="de-DE"/>
+          </a:p>
+          <a:p>
+            <a:pPr lvl="1">
+              <a:lnSpc>
+                <a:spcPct val="114999"/>
+              </a:lnSpc>
+              <a:defRPr/>
+            </a:pPr>
+            <a:r>
+              <a:rPr lang="de-DE"/>
+              <a:t>Same performance as A2C:				~16,000</a:t>
+            </a:r>
+            <a:endParaRPr lang="de-DE"/>
+          </a:p>
+        </p:txBody>
+      </p:sp>
+    </p:spTree>
+  </p:cSld>
+  <p:clrMapOvr>
+    <a:masterClrMapping/>
+  </p:clrMapOvr>
+  <mc:AlternateContent xmlns:mc="http://schemas.openxmlformats.org/markup-compatibility/2006">
+    <mc:Choice xmlns:p14="http://schemas.microsoft.com/office/powerpoint/2010/main" Requires="p14">
+      <p:transition p14:dur="2000" advClick="1"/>
+    </mc:Choice>
+    <mc:Fallback>
+      <p:transition advClick="1"/>
+    </mc:Fallback>
+  </mc:AlternateContent>
+</p:sld>
+</file>
+
+<file path=ppt/slides/slide14.xml><?xml version="1.0" encoding="utf-8"?>
+<p:sld xmlns:a="http://schemas.openxmlformats.org/drawingml/2006/main" xmlns:r="http://schemas.openxmlformats.org/officeDocument/2006/relationships" xmlns:p="http://schemas.openxmlformats.org/presentationml/2006/main" xmlns:m="http://schemas.openxmlformats.org/officeDocument/2006/math" xmlns:w="http://schemas.openxmlformats.org/wordprocessingml/2006/main" showMasterPhAnim="0" show="1">
+  <p:cSld name="">
+    <p:spTree>
+      <p:nvGrpSpPr>
+        <p:cNvPr id="1" name=""/>
+        <p:cNvGrpSpPr/>
+        <p:nvPr/>
+      </p:nvGrpSpPr>
+      <p:grpSpPr bwMode="auto">
+        <a:xfrm>
+          <a:off x="0" y="0"/>
+          <a:ext cx="0" cy="0"/>
+          <a:chOff x="0" y="0"/>
+          <a:chExt cx="0" cy="0"/>
+        </a:xfrm>
+      </p:grpSpPr>
+      <p:sp>
+        <p:nvSpPr>
+          <p:cNvPr id="1289554452" name="Заголовок 1"/>
+          <p:cNvSpPr>
+            <a:spLocks noGrp="1"/>
+          </p:cNvSpPr>
+          <p:nvPr>
+            <p:ph type="title"/>
+          </p:nvPr>
+        </p:nvSpPr>
+        <p:spPr bwMode="auto"/>
+        <p:txBody>
+          <a:bodyPr/>
+          <a:lstStyle/>
+          <a:p>
+            <a:pPr>
+              <a:defRPr/>
+            </a:pPr>
+            <a:r>
+              <a:rPr lang="de-DE"/>
+              <a:t>Conclusion</a:t>
+            </a:r>
+            <a:endParaRPr/>
+          </a:p>
+        </p:txBody>
+      </p:sp>
+      <p:sp>
+        <p:nvSpPr>
+          <p:cNvPr id="304892557" name="Объект 2"/>
+          <p:cNvSpPr>
+            <a:spLocks noGrp="1"/>
+          </p:cNvSpPr>
+          <p:nvPr>
+            <p:ph idx="1"/>
+          </p:nvPr>
+        </p:nvSpPr>
+        <p:spPr bwMode="auto">
+          <a:xfrm flipH="0" flipV="0">
+            <a:off x="609598" y="1600200"/>
+            <a:ext cx="10972800" cy="5054847"/>
+          </a:xfrm>
+        </p:spPr>
+        <p:txBody>
+          <a:bodyPr vertOverflow="overflow" horzOverflow="overflow" vert="horz" wrap="square" lIns="91440" tIns="45720" rIns="91440" bIns="45720" numCol="1" spcCol="0" rtlCol="0" fromWordArt="0" anchor="t" anchorCtr="0" forceAA="0" upright="0" compatLnSpc="0">
+            <a:normAutofit fontScale="90000" lnSpcReduction="2000"/>
+          </a:bodyPr>
+          <a:lstStyle/>
+          <a:p>
+            <a:pPr>
+              <a:lnSpc>
+                <a:spcPct val="114999"/>
+              </a:lnSpc>
+              <a:defRPr/>
+            </a:pPr>
+            <a:r>
+              <a:rPr lang="de-DE"/>
+              <a:t>Environment difficult to implement due to the reward function</a:t>
+            </a:r>
+            <a:endParaRPr lang="de-DE"/>
+          </a:p>
+          <a:p>
+            <a:pPr marL="0" indent="0">
+              <a:lnSpc>
+                <a:spcPct val="114999"/>
+              </a:lnSpc>
+              <a:buFont typeface="Arial"/>
+              <a:buNone/>
+              <a:defRPr/>
+            </a:pPr>
+            <a:endParaRPr lang="de-DE"/>
+          </a:p>
+          <a:p>
+            <a:pPr>
+              <a:lnSpc>
+                <a:spcPct val="114999"/>
+              </a:lnSpc>
+              <a:defRPr/>
+            </a:pPr>
+            <a:r>
+              <a:rPr lang="de-DE"/>
+              <a:t>Now that the observation is kept simple, the best RL agent can be easily reproduced with a manual AI</a:t>
+            </a:r>
+            <a:endParaRPr lang="de-DE"/>
+          </a:p>
+          <a:p>
+            <a:pPr lvl="1">
+              <a:lnSpc>
+                <a:spcPct val="114999"/>
+              </a:lnSpc>
+              <a:defRPr/>
+            </a:pPr>
+            <a:r>
+              <a:rPr lang="de-DE"/>
+              <a:t>However, </a:t>
+            </a:r>
+            <a:r>
+              <a:rPr lang="de-DE"/>
+              <a:t>extending the observation again did not help with the agents performance</a:t>
+            </a:r>
+            <a:endParaRPr lang="de-DE"/>
+          </a:p>
+          <a:p>
+            <a:pPr marL="0" indent="0">
+              <a:lnSpc>
+                <a:spcPct val="114999"/>
+              </a:lnSpc>
+              <a:buFont typeface="Arial"/>
+              <a:buNone/>
+              <a:defRPr/>
+            </a:pPr>
+            <a:endParaRPr lang="de-DE"/>
+          </a:p>
+          <a:p>
+            <a:pPr>
+              <a:lnSpc>
+                <a:spcPct val="114999"/>
+              </a:lnSpc>
+              <a:defRPr/>
+            </a:pPr>
+            <a:r>
+              <a:rPr lang="de-DE"/>
+              <a:t>Current reward is working for training, but actual value not really representative for efficiency (hence only comparison based on run length)</a:t>
+            </a:r>
+            <a:endParaRPr lang="de-DE"/>
           </a:p>
         </p:txBody>
       </p:sp>

</xml_diff>